<commit_message>
Updated Comm section of design review and document
</commit_message>
<xml_diff>
--- a/Documents/Design_review_2_12_2015.pptx
+++ b/Documents/Design_review_2_12_2015.pptx
@@ -13,13 +13,14 @@
     <p:sldId id="261" r:id="rId7"/>
     <p:sldId id="265" r:id="rId8"/>
     <p:sldId id="262" r:id="rId9"/>
-    <p:sldId id="263" r:id="rId10"/>
-    <p:sldId id="264" r:id="rId11"/>
-    <p:sldId id="266" r:id="rId12"/>
-    <p:sldId id="267" r:id="rId13"/>
-    <p:sldId id="268" r:id="rId14"/>
-    <p:sldId id="270" r:id="rId15"/>
-    <p:sldId id="269" r:id="rId16"/>
+    <p:sldId id="264" r:id="rId10"/>
+    <p:sldId id="271" r:id="rId11"/>
+    <p:sldId id="263" r:id="rId12"/>
+    <p:sldId id="266" r:id="rId13"/>
+    <p:sldId id="267" r:id="rId14"/>
+    <p:sldId id="268" r:id="rId15"/>
+    <p:sldId id="270" r:id="rId16"/>
+    <p:sldId id="269" r:id="rId17"/>
   </p:sldIdLst>
   <p:sldSz cx="12192000" cy="6858000"/>
   <p:notesSz cx="6858000" cy="9144000"/>
@@ -5827,11 +5828,7 @@
             <a:pPr algn="l"/>
             <a:r>
               <a:rPr lang="en-US" sz="2400" dirty="0" smtClean="0"/>
-              <a:t>Emeth Thompson		</a:t>
-            </a:r>
-            <a:r>
-              <a:rPr lang="en-US" sz="2400" dirty="0" smtClean="0"/>
-              <a:t>	Joe </a:t>
+              <a:t>Emeth Thompson			Joe </a:t>
             </a:r>
             <a:r>
               <a:rPr lang="en-US" sz="2400" dirty="0" err="1" smtClean="0"/>
@@ -5920,39 +5917,53 @@
           </a:p>
         </p:txBody>
       </p:sp>
+      <p:sp>
+        <p:nvSpPr>
+          <p:cNvPr id="3" name="Content Placeholder 2"/>
+          <p:cNvSpPr>
+            <a:spLocks noGrp="1"/>
+          </p:cNvSpPr>
+          <p:nvPr>
+            <p:ph idx="1"/>
+          </p:nvPr>
+        </p:nvSpPr>
+        <p:spPr/>
+        <p:txBody>
+          <a:bodyPr/>
+          <a:lstStyle/>
+          <a:p>
+            <a:endParaRPr lang="en-US"/>
+          </a:p>
+        </p:txBody>
+      </p:sp>
       <p:pic>
         <p:nvPicPr>
-          <p:cNvPr id="5" name="Content Placeholder 4"/>
+          <p:cNvPr id="4" name="Picture 3"/>
           <p:cNvPicPr>
-            <a:picLocks noGrp="1" noChangeAspect="1"/>
+            <a:picLocks noChangeAspect="1"/>
           </p:cNvPicPr>
-          <p:nvPr>
-            <p:ph idx="1"/>
-          </p:nvPr>
+          <p:nvPr/>
         </p:nvPicPr>
         <p:blipFill>
-          <a:blip r:embed="rId2">
-            <a:extLst>
-              <a:ext uri="{28A0092B-C50C-407E-A947-70E740481C1C}">
-                <a14:useLocalDpi xmlns:a14="http://schemas.microsoft.com/office/drawing/2010/main" val="0"/>
-              </a:ext>
-            </a:extLst>
-          </a:blip>
+          <a:blip r:embed="rId2"/>
           <a:stretch>
             <a:fillRect/>
           </a:stretch>
         </p:blipFill>
         <p:spPr>
           <a:xfrm>
-            <a:off x="3362178" y="1463040"/>
-            <a:ext cx="4295922" cy="4771670"/>
+            <a:off x="2619633" y="1660061"/>
+            <a:ext cx="6518404" cy="4960585"/>
           </a:xfrm>
+          <a:prstGeom prst="rect">
+            <a:avLst/>
+          </a:prstGeom>
         </p:spPr>
       </p:pic>
     </p:spTree>
     <p:extLst>
       <p:ext uri="{BB962C8B-B14F-4D97-AF65-F5344CB8AC3E}">
-        <p14:creationId xmlns:p14="http://schemas.microsoft.com/office/powerpoint/2010/main" val="2704923196"/>
+        <p14:creationId xmlns:p14="http://schemas.microsoft.com/office/powerpoint/2010/main" val="4025348988"/>
       </p:ext>
     </p:extLst>
   </p:cSld>
@@ -6010,88 +6021,45 @@
           <a:p>
             <a:r>
               <a:rPr lang="en-US" sz="4000" dirty="0" smtClean="0"/>
-              <a:t>Mission Control Software</a:t>
+              <a:t>Communications</a:t>
             </a:r>
             <a:endParaRPr lang="en-US" sz="4000" dirty="0"/>
           </a:p>
         </p:txBody>
       </p:sp>
-      <p:sp>
-        <p:nvSpPr>
-          <p:cNvPr id="3" name="Content Placeholder 2"/>
-          <p:cNvSpPr>
-            <a:spLocks noGrp="1"/>
-          </p:cNvSpPr>
+      <p:pic>
+        <p:nvPicPr>
+          <p:cNvPr id="6" name="Content Placeholder 5"/>
+          <p:cNvPicPr>
+            <a:picLocks noGrp="1" noChangeAspect="1"/>
+          </p:cNvPicPr>
           <p:nvPr>
             <p:ph idx="1"/>
           </p:nvPr>
-        </p:nvSpPr>
+        </p:nvPicPr>
+        <p:blipFill>
+          <a:blip r:embed="rId2">
+            <a:extLst>
+              <a:ext uri="{28A0092B-C50C-407E-A947-70E740481C1C}">
+                <a14:useLocalDpi xmlns:a14="http://schemas.microsoft.com/office/drawing/2010/main" val="0"/>
+              </a:ext>
+            </a:extLst>
+          </a:blip>
+          <a:stretch>
+            <a:fillRect/>
+          </a:stretch>
+        </p:blipFill>
         <p:spPr>
           <a:xfrm>
-            <a:off x="1141413" y="1752599"/>
-            <a:ext cx="9905998" cy="4099561"/>
+            <a:off x="3083456" y="1866900"/>
+            <a:ext cx="6021911" cy="3124200"/>
           </a:xfrm>
         </p:spPr>
-        <p:txBody>
-          <a:bodyPr>
-            <a:normAutofit/>
-          </a:bodyPr>
-          <a:lstStyle/>
-          <a:p>
-            <a:pPr marL="0" indent="0">
-              <a:buNone/>
-            </a:pPr>
-            <a:endParaRPr lang="en-US" sz="2800" dirty="0" smtClean="0"/>
-          </a:p>
-          <a:p>
-            <a:pPr marL="0" indent="0">
-              <a:buNone/>
-            </a:pPr>
-            <a:r>
-              <a:rPr lang="en-US" sz="2800" dirty="0" smtClean="0"/>
-              <a:t>goals </a:t>
-            </a:r>
-          </a:p>
-          <a:p>
-            <a:pPr lvl="1"/>
-            <a:r>
-              <a:rPr lang="en-US" sz="2600" dirty="0" smtClean="0"/>
-              <a:t>have topographical data available for mission planning</a:t>
-            </a:r>
-          </a:p>
-          <a:p>
-            <a:pPr lvl="1"/>
-            <a:r>
-              <a:rPr lang="en-US" sz="2600" dirty="0" smtClean="0"/>
-              <a:t>Real time controls </a:t>
-            </a:r>
-          </a:p>
-          <a:p>
-            <a:pPr lvl="2"/>
-            <a:r>
-              <a:rPr lang="en-US" sz="2400" dirty="0" smtClean="0"/>
-              <a:t>Emergency land button</a:t>
-            </a:r>
-          </a:p>
-          <a:p>
-            <a:pPr lvl="2"/>
-            <a:r>
-              <a:rPr lang="en-US" sz="2400" dirty="0" smtClean="0"/>
-              <a:t>Pause mission and hover button</a:t>
-            </a:r>
-          </a:p>
-          <a:p>
-            <a:pPr marL="0" indent="0">
-              <a:buNone/>
-            </a:pPr>
-            <a:endParaRPr lang="en-US" sz="2800" dirty="0" smtClean="0"/>
-          </a:p>
-        </p:txBody>
-      </p:sp>
+      </p:pic>
     </p:spTree>
     <p:extLst>
       <p:ext uri="{BB962C8B-B14F-4D97-AF65-F5344CB8AC3E}">
-        <p14:creationId xmlns:p14="http://schemas.microsoft.com/office/powerpoint/2010/main" val="2388914313"/>
+        <p14:creationId xmlns:p14="http://schemas.microsoft.com/office/powerpoint/2010/main" val="3347087327"/>
       </p:ext>
     </p:extLst>
   </p:cSld>
@@ -6173,14 +6141,14 @@
         </p:spPr>
         <p:txBody>
           <a:bodyPr>
-            <a:normAutofit lnSpcReduction="10000"/>
+            <a:normAutofit/>
           </a:bodyPr>
           <a:lstStyle/>
           <a:p>
-            <a:pPr marL="457200" lvl="1" indent="0">
+            <a:pPr marL="0" indent="0">
               <a:buNone/>
             </a:pPr>
-            <a:endParaRPr lang="en-US" sz="2600" dirty="0"/>
+            <a:endParaRPr lang="en-US" sz="2800" dirty="0" smtClean="0"/>
           </a:p>
           <a:p>
             <a:pPr marL="0" indent="0">
@@ -6188,59 +6156,49 @@
             </a:pPr>
             <a:r>
               <a:rPr lang="en-US" sz="2800" dirty="0" smtClean="0"/>
-              <a:t>Goals</a:t>
+              <a:t>goals </a:t>
+            </a:r>
+          </a:p>
+          <a:p>
+            <a:pPr lvl="1"/>
+            <a:r>
+              <a:rPr lang="en-US" sz="2600" dirty="0" smtClean="0"/>
+              <a:t>have topographical data available for mission planning</a:t>
+            </a:r>
+          </a:p>
+          <a:p>
+            <a:pPr lvl="1"/>
+            <a:r>
+              <a:rPr lang="en-US" sz="2600" dirty="0" smtClean="0"/>
+              <a:t>Real time controls </a:t>
+            </a:r>
+          </a:p>
+          <a:p>
+            <a:pPr lvl="2"/>
+            <a:r>
+              <a:rPr lang="en-US" sz="2400" dirty="0" smtClean="0"/>
+              <a:t>Emergency land button</a:t>
+            </a:r>
+          </a:p>
+          <a:p>
+            <a:pPr lvl="2"/>
+            <a:r>
+              <a:rPr lang="en-US" sz="2400" dirty="0" smtClean="0"/>
+              <a:t>Pause mission and hover button</a:t>
             </a:r>
           </a:p>
           <a:p>
             <a:pPr marL="0" indent="0">
               <a:buNone/>
             </a:pPr>
-            <a:r>
-              <a:rPr lang="en-US" sz="2800" dirty="0" smtClean="0"/>
-              <a:t>Instrument Panel – provides real time information about drone in flight</a:t>
-            </a:r>
-          </a:p>
-          <a:p>
-            <a:pPr lvl="2"/>
-            <a:r>
-              <a:rPr lang="en-US" sz="2400" dirty="0" smtClean="0"/>
-              <a:t>Artificial horizon</a:t>
-            </a:r>
-          </a:p>
-          <a:p>
-            <a:pPr lvl="2"/>
-            <a:r>
-              <a:rPr lang="en-US" sz="2400" dirty="0" smtClean="0"/>
-              <a:t>Vertical speed indicator</a:t>
-            </a:r>
-          </a:p>
-          <a:p>
-            <a:pPr lvl="2"/>
-            <a:r>
-              <a:rPr lang="en-US" sz="2400" dirty="0" smtClean="0"/>
-              <a:t>Dial compass</a:t>
-            </a:r>
-          </a:p>
-          <a:p>
-            <a:pPr lvl="2"/>
-            <a:r>
-              <a:rPr lang="en-US" sz="2400" dirty="0" smtClean="0"/>
-              <a:t>Two minute turn coordinator</a:t>
-            </a:r>
-            <a:endParaRPr lang="en-US" sz="2600" dirty="0" smtClean="0"/>
-          </a:p>
-          <a:p>
             <a:endParaRPr lang="en-US" sz="2800" dirty="0" smtClean="0"/>
-          </a:p>
-          <a:p>
-            <a:endParaRPr lang="en-US" sz="2800" dirty="0"/>
           </a:p>
         </p:txBody>
       </p:sp>
     </p:spTree>
     <p:extLst>
       <p:ext uri="{BB962C8B-B14F-4D97-AF65-F5344CB8AC3E}">
-        <p14:creationId xmlns:p14="http://schemas.microsoft.com/office/powerpoint/2010/main" val="2164130211"/>
+        <p14:creationId xmlns:p14="http://schemas.microsoft.com/office/powerpoint/2010/main" val="2388914313"/>
       </p:ext>
     </p:extLst>
   </p:cSld>
@@ -6321,6 +6279,155 @@
           </a:xfrm>
         </p:spPr>
         <p:txBody>
+          <a:bodyPr>
+            <a:normAutofit lnSpcReduction="10000"/>
+          </a:bodyPr>
+          <a:lstStyle/>
+          <a:p>
+            <a:pPr marL="457200" lvl="1" indent="0">
+              <a:buNone/>
+            </a:pPr>
+            <a:endParaRPr lang="en-US" sz="2600" dirty="0"/>
+          </a:p>
+          <a:p>
+            <a:pPr marL="0" indent="0">
+              <a:buNone/>
+            </a:pPr>
+            <a:r>
+              <a:rPr lang="en-US" sz="2800" dirty="0" smtClean="0"/>
+              <a:t>Goals</a:t>
+            </a:r>
+          </a:p>
+          <a:p>
+            <a:pPr marL="0" indent="0">
+              <a:buNone/>
+            </a:pPr>
+            <a:r>
+              <a:rPr lang="en-US" sz="2800" dirty="0" smtClean="0"/>
+              <a:t>Instrument Panel – provides real time information about drone in flight</a:t>
+            </a:r>
+          </a:p>
+          <a:p>
+            <a:pPr lvl="2"/>
+            <a:r>
+              <a:rPr lang="en-US" sz="2400" dirty="0" smtClean="0"/>
+              <a:t>Artificial horizon</a:t>
+            </a:r>
+          </a:p>
+          <a:p>
+            <a:pPr lvl="2"/>
+            <a:r>
+              <a:rPr lang="en-US" sz="2400" dirty="0" smtClean="0"/>
+              <a:t>Vertical speed indicator</a:t>
+            </a:r>
+          </a:p>
+          <a:p>
+            <a:pPr lvl="2"/>
+            <a:r>
+              <a:rPr lang="en-US" sz="2400" dirty="0" smtClean="0"/>
+              <a:t>Dial compass</a:t>
+            </a:r>
+          </a:p>
+          <a:p>
+            <a:pPr lvl="2"/>
+            <a:r>
+              <a:rPr lang="en-US" sz="2400" dirty="0" smtClean="0"/>
+              <a:t>Two minute turn coordinator</a:t>
+            </a:r>
+            <a:endParaRPr lang="en-US" sz="2600" dirty="0" smtClean="0"/>
+          </a:p>
+          <a:p>
+            <a:endParaRPr lang="en-US" sz="2800" dirty="0" smtClean="0"/>
+          </a:p>
+          <a:p>
+            <a:endParaRPr lang="en-US" sz="2800" dirty="0"/>
+          </a:p>
+        </p:txBody>
+      </p:sp>
+    </p:spTree>
+    <p:extLst>
+      <p:ext uri="{BB962C8B-B14F-4D97-AF65-F5344CB8AC3E}">
+        <p14:creationId xmlns:p14="http://schemas.microsoft.com/office/powerpoint/2010/main" val="2164130211"/>
+      </p:ext>
+    </p:extLst>
+  </p:cSld>
+  <p:clrMapOvr>
+    <a:masterClrMapping/>
+  </p:clrMapOvr>
+  <p:timing>
+    <p:tnLst>
+      <p:par>
+        <p:cTn id="1" dur="indefinite" restart="never" nodeType="tmRoot"/>
+      </p:par>
+    </p:tnLst>
+  </p:timing>
+</p:sld>
+</file>
+
+<file path=ppt/slides/slide14.xml><?xml version="1.0" encoding="utf-8"?>
+<p:sld xmlns:a="http://schemas.openxmlformats.org/drawingml/2006/main" xmlns:r="http://schemas.openxmlformats.org/officeDocument/2006/relationships" xmlns:p="http://schemas.openxmlformats.org/presentationml/2006/main">
+  <p:cSld>
+    <p:spTree>
+      <p:nvGrpSpPr>
+        <p:cNvPr id="1" name=""/>
+        <p:cNvGrpSpPr/>
+        <p:nvPr/>
+      </p:nvGrpSpPr>
+      <p:grpSpPr>
+        <a:xfrm>
+          <a:off x="0" y="0"/>
+          <a:ext cx="0" cy="0"/>
+          <a:chOff x="0" y="0"/>
+          <a:chExt cx="0" cy="0"/>
+        </a:xfrm>
+      </p:grpSpPr>
+      <p:sp>
+        <p:nvSpPr>
+          <p:cNvPr id="2" name="Title 1"/>
+          <p:cNvSpPr>
+            <a:spLocks noGrp="1"/>
+          </p:cNvSpPr>
+          <p:nvPr>
+            <p:ph type="title"/>
+          </p:nvPr>
+        </p:nvSpPr>
+        <p:spPr>
+          <a:xfrm>
+            <a:off x="1141413" y="609600"/>
+            <a:ext cx="9905998" cy="853440"/>
+          </a:xfrm>
+        </p:spPr>
+        <p:txBody>
+          <a:bodyPr>
+            <a:normAutofit/>
+          </a:bodyPr>
+          <a:lstStyle/>
+          <a:p>
+            <a:r>
+              <a:rPr lang="en-US" sz="4000" dirty="0" smtClean="0"/>
+              <a:t>Mission Control Software</a:t>
+            </a:r>
+            <a:endParaRPr lang="en-US" sz="4000" dirty="0"/>
+          </a:p>
+        </p:txBody>
+      </p:sp>
+      <p:sp>
+        <p:nvSpPr>
+          <p:cNvPr id="3" name="Content Placeholder 2"/>
+          <p:cNvSpPr>
+            <a:spLocks noGrp="1"/>
+          </p:cNvSpPr>
+          <p:nvPr>
+            <p:ph idx="1"/>
+          </p:nvPr>
+        </p:nvSpPr>
+        <p:spPr>
+          <a:xfrm>
+            <a:off x="1141413" y="1752599"/>
+            <a:ext cx="9905998" cy="4099561"/>
+          </a:xfrm>
+        </p:spPr>
+        <p:txBody>
           <a:bodyPr anchor="t">
             <a:normAutofit/>
           </a:bodyPr>
@@ -6409,7 +6516,7 @@
 </p:sld>
 </file>
 
-<file path=ppt/slides/slide14.xml><?xml version="1.0" encoding="utf-8"?>
+<file path=ppt/slides/slide15.xml><?xml version="1.0" encoding="utf-8"?>
 <p:sld xmlns:a="http://schemas.openxmlformats.org/drawingml/2006/main" xmlns:r="http://schemas.openxmlformats.org/officeDocument/2006/relationships" xmlns:p="http://schemas.openxmlformats.org/presentationml/2006/main">
   <p:cSld>
     <p:spTree>
@@ -6501,7 +6608,7 @@
 </p:sld>
 </file>
 
-<file path=ppt/slides/slide15.xml><?xml version="1.0" encoding="utf-8"?>
+<file path=ppt/slides/slide16.xml><?xml version="1.0" encoding="utf-8"?>
 <p:sld xmlns:a="http://schemas.openxmlformats.org/drawingml/2006/main" xmlns:r="http://schemas.openxmlformats.org/officeDocument/2006/relationships" xmlns:p="http://schemas.openxmlformats.org/presentationml/2006/main">
   <p:cSld>
     <p:spTree>
@@ -6872,7 +6979,6 @@
               <a:rPr lang="en-US" sz="2600" dirty="0" smtClean="0"/>
               <a:t>Implement Drone Hardware for flight control</a:t>
             </a:r>
-            <a:endParaRPr lang="en-US" sz="2600" dirty="0" smtClean="0"/>
           </a:p>
           <a:p>
             <a:endParaRPr lang="en-US" sz="2800" dirty="0"/>
@@ -7499,7 +7605,7 @@
       </p:sp>
       <p:pic>
         <p:nvPicPr>
-          <p:cNvPr id="6" name="Content Placeholder 5"/>
+          <p:cNvPr id="5" name="Content Placeholder 4"/>
           <p:cNvPicPr>
             <a:picLocks noGrp="1" noChangeAspect="1"/>
           </p:cNvPicPr>
@@ -7521,15 +7627,15 @@
         </p:blipFill>
         <p:spPr>
           <a:xfrm>
-            <a:off x="3083456" y="1866900"/>
-            <a:ext cx="6021911" cy="3124200"/>
+            <a:off x="3362178" y="1463040"/>
+            <a:ext cx="4295922" cy="4771670"/>
           </a:xfrm>
         </p:spPr>
       </p:pic>
     </p:spTree>
     <p:extLst>
       <p:ext uri="{BB962C8B-B14F-4D97-AF65-F5344CB8AC3E}">
-        <p14:creationId xmlns:p14="http://schemas.microsoft.com/office/powerpoint/2010/main" val="3347087327"/>
+        <p14:creationId xmlns:p14="http://schemas.microsoft.com/office/powerpoint/2010/main" val="2704923196"/>
       </p:ext>
     </p:extLst>
   </p:cSld>

</xml_diff>